<commit_message>
Fixed bug for Spencer's Method for right-facing slopes
</commit_message>
<xml_diff>
--- a/right_face_spencer_debug.pptx
+++ b/right_face_spencer_debug.pptx
@@ -108,6 +108,11 @@
       </a:defRPr>
     </a:lvl9pPr>
   </p:defaultTextStyle>
+  <p:extLst>
+    <p:ext uri="{EFAFB233-063F-42B5-8137-9DF3F51BA10A}">
+      <p15:sldGuideLst xmlns:p15="http://schemas.microsoft.com/office/powerpoint/2012/main"/>
+    </p:ext>
+  </p:extLst>
 </p:presentation>
 </file>
 
@@ -258,7 +263,7 @@
           <a:p>
             <a:fld id="{B394E254-F978-744F-B3E1-D1E62C0E9B1C}" type="datetimeFigureOut">
               <a:rPr lang="en-US" smtClean="0"/>
-              <a:t>7/9/25</a:t>
+              <a:t>7/11/25</a:t>
             </a:fld>
             <a:endParaRPr lang="en-US"/>
           </a:p>
@@ -456,7 +461,7 @@
           <a:p>
             <a:fld id="{B394E254-F978-744F-B3E1-D1E62C0E9B1C}" type="datetimeFigureOut">
               <a:rPr lang="en-US" smtClean="0"/>
-              <a:t>7/9/25</a:t>
+              <a:t>7/11/25</a:t>
             </a:fld>
             <a:endParaRPr lang="en-US"/>
           </a:p>
@@ -664,7 +669,7 @@
           <a:p>
             <a:fld id="{B394E254-F978-744F-B3E1-D1E62C0E9B1C}" type="datetimeFigureOut">
               <a:rPr lang="en-US" smtClean="0"/>
-              <a:t>7/9/25</a:t>
+              <a:t>7/11/25</a:t>
             </a:fld>
             <a:endParaRPr lang="en-US"/>
           </a:p>
@@ -862,7 +867,7 @@
           <a:p>
             <a:fld id="{B394E254-F978-744F-B3E1-D1E62C0E9B1C}" type="datetimeFigureOut">
               <a:rPr lang="en-US" smtClean="0"/>
-              <a:t>7/9/25</a:t>
+              <a:t>7/11/25</a:t>
             </a:fld>
             <a:endParaRPr lang="en-US"/>
           </a:p>
@@ -1137,7 +1142,7 @@
           <a:p>
             <a:fld id="{B394E254-F978-744F-B3E1-D1E62C0E9B1C}" type="datetimeFigureOut">
               <a:rPr lang="en-US" smtClean="0"/>
-              <a:t>7/9/25</a:t>
+              <a:t>7/11/25</a:t>
             </a:fld>
             <a:endParaRPr lang="en-US"/>
           </a:p>
@@ -1402,7 +1407,7 @@
           <a:p>
             <a:fld id="{B394E254-F978-744F-B3E1-D1E62C0E9B1C}" type="datetimeFigureOut">
               <a:rPr lang="en-US" smtClean="0"/>
-              <a:t>7/9/25</a:t>
+              <a:t>7/11/25</a:t>
             </a:fld>
             <a:endParaRPr lang="en-US"/>
           </a:p>
@@ -1814,7 +1819,7 @@
           <a:p>
             <a:fld id="{B394E254-F978-744F-B3E1-D1E62C0E9B1C}" type="datetimeFigureOut">
               <a:rPr lang="en-US" smtClean="0"/>
-              <a:t>7/9/25</a:t>
+              <a:t>7/11/25</a:t>
             </a:fld>
             <a:endParaRPr lang="en-US"/>
           </a:p>
@@ -1955,7 +1960,7 @@
           <a:p>
             <a:fld id="{B394E254-F978-744F-B3E1-D1E62C0E9B1C}" type="datetimeFigureOut">
               <a:rPr lang="en-US" smtClean="0"/>
-              <a:t>7/9/25</a:t>
+              <a:t>7/11/25</a:t>
             </a:fld>
             <a:endParaRPr lang="en-US"/>
           </a:p>
@@ -2068,7 +2073,7 @@
           <a:p>
             <a:fld id="{B394E254-F978-744F-B3E1-D1E62C0E9B1C}" type="datetimeFigureOut">
               <a:rPr lang="en-US" smtClean="0"/>
-              <a:t>7/9/25</a:t>
+              <a:t>7/11/25</a:t>
             </a:fld>
             <a:endParaRPr lang="en-US"/>
           </a:p>
@@ -2379,7 +2384,7 @@
           <a:p>
             <a:fld id="{B394E254-F978-744F-B3E1-D1E62C0E9B1C}" type="datetimeFigureOut">
               <a:rPr lang="en-US" smtClean="0"/>
-              <a:t>7/9/25</a:t>
+              <a:t>7/11/25</a:t>
             </a:fld>
             <a:endParaRPr lang="en-US"/>
           </a:p>
@@ -2667,7 +2672,7 @@
           <a:p>
             <a:fld id="{B394E254-F978-744F-B3E1-D1E62C0E9B1C}" type="datetimeFigureOut">
               <a:rPr lang="en-US" smtClean="0"/>
-              <a:t>7/9/25</a:t>
+              <a:t>7/11/25</a:t>
             </a:fld>
             <a:endParaRPr lang="en-US"/>
           </a:p>
@@ -2908,7 +2913,7 @@
           <a:p>
             <a:fld id="{B394E254-F978-744F-B3E1-D1E62C0E9B1C}" type="datetimeFigureOut">
               <a:rPr lang="en-US" smtClean="0"/>
-              <a:t>7/9/25</a:t>
+              <a:t>7/11/25</a:t>
             </a:fld>
             <a:endParaRPr lang="en-US"/>
           </a:p>
@@ -3565,6 +3570,94 @@
           <a:chExt cx="0" cy="0"/>
         </a:xfrm>
       </p:grpSpPr>
+      <p:pic>
+        <p:nvPicPr>
+          <p:cNvPr id="2" name="Picture 1">
+            <a:extLst>
+              <a:ext uri="{FF2B5EF4-FFF2-40B4-BE49-F238E27FC236}">
+                <a16:creationId xmlns:a16="http://schemas.microsoft.com/office/drawing/2014/main" id="{4863CB26-95D6-E3E2-A14A-066A4A3B9D59}"/>
+              </a:ext>
+            </a:extLst>
+          </p:cNvPr>
+          <p:cNvPicPr>
+            <a:picLocks noChangeAspect="1"/>
+          </p:cNvPicPr>
+          <p:nvPr/>
+        </p:nvPicPr>
+        <p:blipFill>
+          <a:blip r:embed="rId2"/>
+          <a:stretch>
+            <a:fillRect/>
+          </a:stretch>
+        </p:blipFill>
+        <p:spPr>
+          <a:xfrm>
+            <a:off x="321623" y="711447"/>
+            <a:ext cx="7772400" cy="4176321"/>
+          </a:xfrm>
+          <a:prstGeom prst="rect">
+            <a:avLst/>
+          </a:prstGeom>
+        </p:spPr>
+      </p:pic>
+      <p:sp>
+        <p:nvSpPr>
+          <p:cNvPr id="3" name="TextBox 2">
+            <a:extLst>
+              <a:ext uri="{FF2B5EF4-FFF2-40B4-BE49-F238E27FC236}">
+                <a16:creationId xmlns:a16="http://schemas.microsoft.com/office/drawing/2014/main" id="{82FCE75C-8B18-8E74-F3B7-D380C6D3C6EE}"/>
+              </a:ext>
+            </a:extLst>
+          </p:cNvPr>
+          <p:cNvSpPr txBox="1"/>
+          <p:nvPr/>
+        </p:nvSpPr>
+        <p:spPr>
+          <a:xfrm>
+            <a:off x="8324603" y="926275"/>
+            <a:ext cx="3194462" cy="2862322"/>
+          </a:xfrm>
+          <a:prstGeom prst="rect">
+            <a:avLst/>
+          </a:prstGeom>
+          <a:noFill/>
+        </p:spPr>
+        <p:txBody>
+          <a:bodyPr wrap="square" rtlCol="0">
+            <a:spAutoFit/>
+          </a:bodyPr>
+          <a:lstStyle/>
+          <a:p>
+            <a:r>
+              <a:rPr lang="en-US" dirty="0"/>
+              <a:t>I got this by flipping the sign on:</a:t>
+            </a:r>
+          </a:p>
+          <a:p>
+            <a:endParaRPr lang="en-US" dirty="0"/>
+          </a:p>
+          <a:p>
+            <a:r>
+              <a:rPr lang="en-US" dirty="0"/>
+              <a:t>alpha (reverts to the true angle)</a:t>
+            </a:r>
+          </a:p>
+          <a:p>
+            <a:endParaRPr lang="en-US" dirty="0"/>
+          </a:p>
+          <a:p>
+            <a:r>
+              <a:rPr lang="en-US" dirty="0"/>
+              <a:t>c  and tan(phi). This ensures that the shear force is going in the proper direction against the sliding angle of </a:t>
+            </a:r>
+            <a:r>
+              <a:rPr lang="en-US"/>
+              <a:t>the slope.</a:t>
+            </a:r>
+            <a:endParaRPr lang="en-US" dirty="0"/>
+          </a:p>
+        </p:txBody>
+      </p:sp>
     </p:spTree>
     <p:extLst>
       <p:ext uri="{BB962C8B-B14F-4D97-AF65-F5344CB8AC3E}">

</xml_diff>